<commit_message>
Added slide on xss and sql injection
</commit_message>
<xml_diff>
--- a/Outline.pptx
+++ b/Outline.pptx
@@ -12,10 +12,11 @@
     <p:sldId id="260" r:id="rId6"/>
     <p:sldId id="261" r:id="rId7"/>
     <p:sldId id="262" r:id="rId8"/>
-    <p:sldId id="263" r:id="rId9"/>
-    <p:sldId id="264" r:id="rId10"/>
-    <p:sldId id="265" r:id="rId11"/>
-    <p:sldId id="266" r:id="rId12"/>
+    <p:sldId id="267" r:id="rId9"/>
+    <p:sldId id="263" r:id="rId10"/>
+    <p:sldId id="264" r:id="rId11"/>
+    <p:sldId id="265" r:id="rId12"/>
+    <p:sldId id="266" r:id="rId13"/>
   </p:sldIdLst>
   <p:sldSz cx="12192000" cy="6858000"/>
   <p:notesSz cx="6858000" cy="9144000"/>
@@ -114,6 +115,11 @@
       </a:defRPr>
     </a:lvl9pPr>
   </p:defaultTextStyle>
+  <p:extLst>
+    <p:ext uri="{EFAFB233-063F-42B5-8137-9DF3F51BA10A}">
+      <p15:sldGuideLst xmlns:p15="http://schemas.microsoft.com/office/powerpoint/2012/main"/>
+    </p:ext>
+  </p:extLst>
 </p:presentation>
 </file>
 
@@ -5474,6 +5480,216 @@
       </p:grpSpPr>
       <p:pic>
         <p:nvPicPr>
+          <p:cNvPr id="5" name="Picture 4">
+            <a:extLst>
+              <a:ext uri="{FF2B5EF4-FFF2-40B4-BE49-F238E27FC236}">
+                <a16:creationId xmlns:a16="http://schemas.microsoft.com/office/drawing/2014/main" id="{D5007326-E180-43FD-B404-49E5ED09367E}"/>
+              </a:ext>
+            </a:extLst>
+          </p:cNvPr>
+          <p:cNvPicPr>
+            <a:picLocks noChangeAspect="1"/>
+          </p:cNvPicPr>
+          <p:nvPr/>
+        </p:nvPicPr>
+        <p:blipFill>
+          <a:blip r:embed="rId2"/>
+          <a:stretch>
+            <a:fillRect/>
+          </a:stretch>
+        </p:blipFill>
+        <p:spPr>
+          <a:xfrm>
+            <a:off x="914135" y="3095435"/>
+            <a:ext cx="3791479" cy="2724530"/>
+          </a:xfrm>
+          <a:prstGeom prst="rect">
+            <a:avLst/>
+          </a:prstGeom>
+        </p:spPr>
+      </p:pic>
+      <p:pic>
+        <p:nvPicPr>
+          <p:cNvPr id="7" name="Picture 6">
+            <a:extLst>
+              <a:ext uri="{FF2B5EF4-FFF2-40B4-BE49-F238E27FC236}">
+                <a16:creationId xmlns:a16="http://schemas.microsoft.com/office/drawing/2014/main" id="{C12F6561-6F21-4E7D-A58D-EAF7084E83BC}"/>
+              </a:ext>
+            </a:extLst>
+          </p:cNvPr>
+          <p:cNvPicPr>
+            <a:picLocks noChangeAspect="1"/>
+          </p:cNvPicPr>
+          <p:nvPr/>
+        </p:nvPicPr>
+        <p:blipFill>
+          <a:blip r:embed="rId3"/>
+          <a:stretch>
+            <a:fillRect/>
+          </a:stretch>
+        </p:blipFill>
+        <p:spPr>
+          <a:xfrm>
+            <a:off x="7600757" y="738046"/>
+            <a:ext cx="2762636" cy="2029108"/>
+          </a:xfrm>
+          <a:prstGeom prst="rect">
+            <a:avLst/>
+          </a:prstGeom>
+        </p:spPr>
+      </p:pic>
+      <p:pic>
+        <p:nvPicPr>
+          <p:cNvPr id="9" name="Picture 8">
+            <a:extLst>
+              <a:ext uri="{FF2B5EF4-FFF2-40B4-BE49-F238E27FC236}">
+                <a16:creationId xmlns:a16="http://schemas.microsoft.com/office/drawing/2014/main" id="{D0CECA21-E13E-45B8-81D1-A48202054ADC}"/>
+              </a:ext>
+            </a:extLst>
+          </p:cNvPr>
+          <p:cNvPicPr>
+            <a:picLocks noChangeAspect="1"/>
+          </p:cNvPicPr>
+          <p:nvPr/>
+        </p:nvPicPr>
+        <p:blipFill>
+          <a:blip r:embed="rId4"/>
+          <a:stretch>
+            <a:fillRect/>
+          </a:stretch>
+        </p:blipFill>
+        <p:spPr>
+          <a:xfrm>
+            <a:off x="6096000" y="3252669"/>
+            <a:ext cx="4048690" cy="2143424"/>
+          </a:xfrm>
+          <a:prstGeom prst="rect">
+            <a:avLst/>
+          </a:prstGeom>
+        </p:spPr>
+      </p:pic>
+      <p:pic>
+        <p:nvPicPr>
+          <p:cNvPr id="11" name="Picture 10">
+            <a:extLst>
+              <a:ext uri="{FF2B5EF4-FFF2-40B4-BE49-F238E27FC236}">
+                <a16:creationId xmlns:a16="http://schemas.microsoft.com/office/drawing/2014/main" id="{92F74070-16AA-4869-B49F-A769D2EE56E2}"/>
+              </a:ext>
+            </a:extLst>
+          </p:cNvPr>
+          <p:cNvPicPr>
+            <a:picLocks noChangeAspect="1"/>
+          </p:cNvPicPr>
+          <p:nvPr/>
+        </p:nvPicPr>
+        <p:blipFill>
+          <a:blip r:embed="rId5"/>
+          <a:stretch>
+            <a:fillRect/>
+          </a:stretch>
+        </p:blipFill>
+        <p:spPr>
+          <a:xfrm>
+            <a:off x="5967344" y="1461907"/>
+            <a:ext cx="981212" cy="438211"/>
+          </a:xfrm>
+          <a:prstGeom prst="rect">
+            <a:avLst/>
+          </a:prstGeom>
+        </p:spPr>
+      </p:pic>
+      <p:sp>
+        <p:nvSpPr>
+          <p:cNvPr id="12" name="TextBox 11">
+            <a:extLst>
+              <a:ext uri="{FF2B5EF4-FFF2-40B4-BE49-F238E27FC236}">
+                <a16:creationId xmlns:a16="http://schemas.microsoft.com/office/drawing/2014/main" id="{95EB8E7C-A52A-4799-94A5-CB7892FBD08D}"/>
+              </a:ext>
+            </a:extLst>
+          </p:cNvPr>
+          <p:cNvSpPr txBox="1"/>
+          <p:nvPr/>
+        </p:nvSpPr>
+        <p:spPr>
+          <a:xfrm>
+            <a:off x="1171574" y="1200150"/>
+            <a:ext cx="3090601" cy="369332"/>
+          </a:xfrm>
+          <a:prstGeom prst="rect">
+            <a:avLst/>
+          </a:prstGeom>
+          <a:noFill/>
+        </p:spPr>
+        <p:txBody>
+          <a:bodyPr wrap="square" rtlCol="0">
+            <a:spAutoFit/>
+          </a:bodyPr>
+          <a:lstStyle/>
+          <a:p>
+            <a:r>
+              <a:rPr lang="en-US" dirty="0" err="1"/>
+              <a:t>Konfiguracja</a:t>
+            </a:r>
+            <a:r>
+              <a:rPr lang="en-US" dirty="0"/>
+              <a:t> </a:t>
+            </a:r>
+            <a:r>
+              <a:rPr lang="en-US" dirty="0" err="1"/>
+              <a:t>dockera</a:t>
+            </a:r>
+            <a:r>
+              <a:rPr lang="en-US" dirty="0"/>
+              <a:t> </a:t>
+            </a:r>
+            <a:r>
+              <a:rPr lang="en-US" dirty="0" err="1"/>
+              <a:t>i</a:t>
+            </a:r>
+            <a:r>
+              <a:rPr lang="en-US" dirty="0"/>
+              <a:t> </a:t>
+            </a:r>
+            <a:r>
+              <a:rPr lang="en-US" dirty="0" err="1"/>
+              <a:t>ssl</a:t>
+            </a:r>
+            <a:endParaRPr lang="pl-PL" dirty="0"/>
+          </a:p>
+        </p:txBody>
+      </p:sp>
+    </p:spTree>
+    <p:extLst>
+      <p:ext uri="{BB962C8B-B14F-4D97-AF65-F5344CB8AC3E}">
+        <p14:creationId xmlns:p14="http://schemas.microsoft.com/office/powerpoint/2010/main" val="2968921025"/>
+      </p:ext>
+    </p:extLst>
+  </p:cSld>
+  <p:clrMapOvr>
+    <a:masterClrMapping/>
+  </p:clrMapOvr>
+</p:sld>
+</file>
+
+<file path=ppt/slides/slide11.xml><?xml version="1.0" encoding="utf-8"?>
+<p:sld xmlns:a="http://schemas.openxmlformats.org/drawingml/2006/main" xmlns:r="http://schemas.openxmlformats.org/officeDocument/2006/relationships" xmlns:p="http://schemas.openxmlformats.org/presentationml/2006/main">
+  <p:cSld>
+    <p:spTree>
+      <p:nvGrpSpPr>
+        <p:cNvPr id="1" name=""/>
+        <p:cNvGrpSpPr/>
+        <p:nvPr/>
+      </p:nvGrpSpPr>
+      <p:grpSpPr>
+        <a:xfrm>
+          <a:off x="0" y="0"/>
+          <a:ext cx="0" cy="0"/>
+          <a:chOff x="0" y="0"/>
+          <a:chExt cx="0" cy="0"/>
+        </a:xfrm>
+      </p:grpSpPr>
+      <p:pic>
+        <p:nvPicPr>
           <p:cNvPr id="17" name="Picture 16" descr="Graphical user interface, text, application&#10;&#10;Description automatically generated">
             <a:extLst>
               <a:ext uri="{FF2B5EF4-FFF2-40B4-BE49-F238E27FC236}">
@@ -5755,7 +5971,7 @@
 </p:sld>
 </file>
 
-<file path=ppt/slides/slide11.xml><?xml version="1.0" encoding="utf-8"?>
+<file path=ppt/slides/slide12.xml><?xml version="1.0" encoding="utf-8"?>
 <p:sld xmlns:a="http://schemas.openxmlformats.org/drawingml/2006/main" xmlns:r="http://schemas.openxmlformats.org/officeDocument/2006/relationships" xmlns:p="http://schemas.openxmlformats.org/presentationml/2006/main">
   <p:cSld>
     <p:spTree>
@@ -6220,8 +6436,8 @@
         </p:nvSpPr>
         <p:spPr>
           <a:xfrm>
-            <a:off x="742950" y="495300"/>
-            <a:ext cx="3752850" cy="369332"/>
+            <a:off x="742949" y="495300"/>
+            <a:ext cx="6798587" cy="369332"/>
           </a:xfrm>
           <a:prstGeom prst="rect">
             <a:avLst/>
@@ -6253,6 +6469,18 @@
             <a:r>
               <a:rPr lang="en-US" dirty="0" err="1"/>
               <a:t>danych</a:t>
+            </a:r>
+            <a:r>
+              <a:rPr lang="en-US" dirty="0"/>
+              <a:t>, </a:t>
+            </a:r>
+            <a:r>
+              <a:rPr lang="en-US" dirty="0" err="1"/>
+              <a:t>zapobieganie</a:t>
+            </a:r>
+            <a:r>
+              <a:rPr lang="en-US" dirty="0"/>
+              <a:t> SQL injection</a:t>
             </a:r>
             <a:endParaRPr lang="pl-PL" dirty="0"/>
           </a:p>
@@ -6600,6 +6828,136 @@
 </file>
 
 <file path=ppt/slides/slide8.xml><?xml version="1.0" encoding="utf-8"?>
+<p:sld xmlns:a="http://schemas.openxmlformats.org/drawingml/2006/main" xmlns:r="http://schemas.openxmlformats.org/officeDocument/2006/relationships" xmlns:p="http://schemas.openxmlformats.org/presentationml/2006/main">
+  <p:cSld>
+    <p:spTree>
+      <p:nvGrpSpPr>
+        <p:cNvPr id="1" name=""/>
+        <p:cNvGrpSpPr/>
+        <p:nvPr/>
+      </p:nvGrpSpPr>
+      <p:grpSpPr>
+        <a:xfrm>
+          <a:off x="0" y="0"/>
+          <a:ext cx="0" cy="0"/>
+          <a:chOff x="0" y="0"/>
+          <a:chExt cx="0" cy="0"/>
+        </a:xfrm>
+      </p:grpSpPr>
+      <p:pic>
+        <p:nvPicPr>
+          <p:cNvPr id="5" name="Picture 4">
+            <a:extLst>
+              <a:ext uri="{FF2B5EF4-FFF2-40B4-BE49-F238E27FC236}">
+                <a16:creationId xmlns:a16="http://schemas.microsoft.com/office/drawing/2014/main" id="{5B6198E6-2D8A-41FF-9C14-96EAE215C6F1}"/>
+              </a:ext>
+            </a:extLst>
+          </p:cNvPr>
+          <p:cNvPicPr>
+            <a:picLocks noChangeAspect="1"/>
+          </p:cNvPicPr>
+          <p:nvPr/>
+        </p:nvPicPr>
+        <p:blipFill>
+          <a:blip r:embed="rId2"/>
+          <a:stretch>
+            <a:fillRect/>
+          </a:stretch>
+        </p:blipFill>
+        <p:spPr>
+          <a:xfrm>
+            <a:off x="2062407" y="3872526"/>
+            <a:ext cx="7306695" cy="2010056"/>
+          </a:xfrm>
+          <a:prstGeom prst="rect">
+            <a:avLst/>
+          </a:prstGeom>
+        </p:spPr>
+      </p:pic>
+      <p:pic>
+        <p:nvPicPr>
+          <p:cNvPr id="7" name="Picture 6">
+            <a:extLst>
+              <a:ext uri="{FF2B5EF4-FFF2-40B4-BE49-F238E27FC236}">
+                <a16:creationId xmlns:a16="http://schemas.microsoft.com/office/drawing/2014/main" id="{07367629-8AEF-445E-B94C-056DB820AADB}"/>
+              </a:ext>
+            </a:extLst>
+          </p:cNvPr>
+          <p:cNvPicPr>
+            <a:picLocks noChangeAspect="1"/>
+          </p:cNvPicPr>
+          <p:nvPr/>
+        </p:nvPicPr>
+        <p:blipFill>
+          <a:blip r:embed="rId3"/>
+          <a:stretch>
+            <a:fillRect/>
+          </a:stretch>
+        </p:blipFill>
+        <p:spPr>
+          <a:xfrm>
+            <a:off x="5438463" y="338099"/>
+            <a:ext cx="5153744" cy="3248478"/>
+          </a:xfrm>
+          <a:prstGeom prst="rect">
+            <a:avLst/>
+          </a:prstGeom>
+        </p:spPr>
+      </p:pic>
+      <p:sp>
+        <p:nvSpPr>
+          <p:cNvPr id="8" name="TextBox 7">
+            <a:extLst>
+              <a:ext uri="{FF2B5EF4-FFF2-40B4-BE49-F238E27FC236}">
+                <a16:creationId xmlns:a16="http://schemas.microsoft.com/office/drawing/2014/main" id="{025D23E1-CDB3-4D91-9404-C45015EF91B0}"/>
+              </a:ext>
+            </a:extLst>
+          </p:cNvPr>
+          <p:cNvSpPr txBox="1"/>
+          <p:nvPr/>
+        </p:nvSpPr>
+        <p:spPr>
+          <a:xfrm>
+            <a:off x="1892175" y="790752"/>
+            <a:ext cx="2254313" cy="369332"/>
+          </a:xfrm>
+          <a:prstGeom prst="rect">
+            <a:avLst/>
+          </a:prstGeom>
+          <a:noFill/>
+        </p:spPr>
+        <p:txBody>
+          <a:bodyPr wrap="square" rtlCol="0">
+            <a:spAutoFit/>
+          </a:bodyPr>
+          <a:lstStyle/>
+          <a:p>
+            <a:r>
+              <a:rPr lang="en-US" dirty="0" err="1"/>
+              <a:t>Zapobieganie</a:t>
+            </a:r>
+            <a:r>
+              <a:rPr lang="en-US" dirty="0"/>
+              <a:t> XSS</a:t>
+            </a:r>
+            <a:endParaRPr lang="pl-PL" dirty="0"/>
+          </a:p>
+        </p:txBody>
+      </p:sp>
+    </p:spTree>
+    <p:extLst>
+      <p:ext uri="{BB962C8B-B14F-4D97-AF65-F5344CB8AC3E}">
+        <p14:creationId xmlns:p14="http://schemas.microsoft.com/office/powerpoint/2010/main" val="4288679387"/>
+      </p:ext>
+    </p:extLst>
+  </p:cSld>
+  <p:clrMapOvr>
+    <a:masterClrMapping/>
+  </p:clrMapOvr>
+</p:sld>
+</file>
+
+<file path=ppt/slides/slide9.xml><?xml version="1.0" encoding="utf-8"?>
 <p:sld xmlns:a="http://schemas.openxmlformats.org/drawingml/2006/main" xmlns:r="http://schemas.openxmlformats.org/officeDocument/2006/relationships" xmlns:p="http://schemas.openxmlformats.org/presentationml/2006/main">
   <p:cSld>
     <p:spTree>
@@ -6724,216 +7082,6 @@
     <p:extLst>
       <p:ext uri="{BB962C8B-B14F-4D97-AF65-F5344CB8AC3E}">
         <p14:creationId xmlns:p14="http://schemas.microsoft.com/office/powerpoint/2010/main" val="3867817876"/>
-      </p:ext>
-    </p:extLst>
-  </p:cSld>
-  <p:clrMapOvr>
-    <a:masterClrMapping/>
-  </p:clrMapOvr>
-</p:sld>
-</file>
-
-<file path=ppt/slides/slide9.xml><?xml version="1.0" encoding="utf-8"?>
-<p:sld xmlns:a="http://schemas.openxmlformats.org/drawingml/2006/main" xmlns:r="http://schemas.openxmlformats.org/officeDocument/2006/relationships" xmlns:p="http://schemas.openxmlformats.org/presentationml/2006/main">
-  <p:cSld>
-    <p:spTree>
-      <p:nvGrpSpPr>
-        <p:cNvPr id="1" name=""/>
-        <p:cNvGrpSpPr/>
-        <p:nvPr/>
-      </p:nvGrpSpPr>
-      <p:grpSpPr>
-        <a:xfrm>
-          <a:off x="0" y="0"/>
-          <a:ext cx="0" cy="0"/>
-          <a:chOff x="0" y="0"/>
-          <a:chExt cx="0" cy="0"/>
-        </a:xfrm>
-      </p:grpSpPr>
-      <p:pic>
-        <p:nvPicPr>
-          <p:cNvPr id="5" name="Picture 4">
-            <a:extLst>
-              <a:ext uri="{FF2B5EF4-FFF2-40B4-BE49-F238E27FC236}">
-                <a16:creationId xmlns:a16="http://schemas.microsoft.com/office/drawing/2014/main" id="{D5007326-E180-43FD-B404-49E5ED09367E}"/>
-              </a:ext>
-            </a:extLst>
-          </p:cNvPr>
-          <p:cNvPicPr>
-            <a:picLocks noChangeAspect="1"/>
-          </p:cNvPicPr>
-          <p:nvPr/>
-        </p:nvPicPr>
-        <p:blipFill>
-          <a:blip r:embed="rId2"/>
-          <a:stretch>
-            <a:fillRect/>
-          </a:stretch>
-        </p:blipFill>
-        <p:spPr>
-          <a:xfrm>
-            <a:off x="914135" y="3095435"/>
-            <a:ext cx="3791479" cy="2724530"/>
-          </a:xfrm>
-          <a:prstGeom prst="rect">
-            <a:avLst/>
-          </a:prstGeom>
-        </p:spPr>
-      </p:pic>
-      <p:pic>
-        <p:nvPicPr>
-          <p:cNvPr id="7" name="Picture 6">
-            <a:extLst>
-              <a:ext uri="{FF2B5EF4-FFF2-40B4-BE49-F238E27FC236}">
-                <a16:creationId xmlns:a16="http://schemas.microsoft.com/office/drawing/2014/main" id="{C12F6561-6F21-4E7D-A58D-EAF7084E83BC}"/>
-              </a:ext>
-            </a:extLst>
-          </p:cNvPr>
-          <p:cNvPicPr>
-            <a:picLocks noChangeAspect="1"/>
-          </p:cNvPicPr>
-          <p:nvPr/>
-        </p:nvPicPr>
-        <p:blipFill>
-          <a:blip r:embed="rId3"/>
-          <a:stretch>
-            <a:fillRect/>
-          </a:stretch>
-        </p:blipFill>
-        <p:spPr>
-          <a:xfrm>
-            <a:off x="7600757" y="738046"/>
-            <a:ext cx="2762636" cy="2029108"/>
-          </a:xfrm>
-          <a:prstGeom prst="rect">
-            <a:avLst/>
-          </a:prstGeom>
-        </p:spPr>
-      </p:pic>
-      <p:pic>
-        <p:nvPicPr>
-          <p:cNvPr id="9" name="Picture 8">
-            <a:extLst>
-              <a:ext uri="{FF2B5EF4-FFF2-40B4-BE49-F238E27FC236}">
-                <a16:creationId xmlns:a16="http://schemas.microsoft.com/office/drawing/2014/main" id="{D0CECA21-E13E-45B8-81D1-A48202054ADC}"/>
-              </a:ext>
-            </a:extLst>
-          </p:cNvPr>
-          <p:cNvPicPr>
-            <a:picLocks noChangeAspect="1"/>
-          </p:cNvPicPr>
-          <p:nvPr/>
-        </p:nvPicPr>
-        <p:blipFill>
-          <a:blip r:embed="rId4"/>
-          <a:stretch>
-            <a:fillRect/>
-          </a:stretch>
-        </p:blipFill>
-        <p:spPr>
-          <a:xfrm>
-            <a:off x="6096000" y="3252669"/>
-            <a:ext cx="4048690" cy="2143424"/>
-          </a:xfrm>
-          <a:prstGeom prst="rect">
-            <a:avLst/>
-          </a:prstGeom>
-        </p:spPr>
-      </p:pic>
-      <p:pic>
-        <p:nvPicPr>
-          <p:cNvPr id="11" name="Picture 10">
-            <a:extLst>
-              <a:ext uri="{FF2B5EF4-FFF2-40B4-BE49-F238E27FC236}">
-                <a16:creationId xmlns:a16="http://schemas.microsoft.com/office/drawing/2014/main" id="{92F74070-16AA-4869-B49F-A769D2EE56E2}"/>
-              </a:ext>
-            </a:extLst>
-          </p:cNvPr>
-          <p:cNvPicPr>
-            <a:picLocks noChangeAspect="1"/>
-          </p:cNvPicPr>
-          <p:nvPr/>
-        </p:nvPicPr>
-        <p:blipFill>
-          <a:blip r:embed="rId5"/>
-          <a:stretch>
-            <a:fillRect/>
-          </a:stretch>
-        </p:blipFill>
-        <p:spPr>
-          <a:xfrm>
-            <a:off x="5967344" y="1461907"/>
-            <a:ext cx="981212" cy="438211"/>
-          </a:xfrm>
-          <a:prstGeom prst="rect">
-            <a:avLst/>
-          </a:prstGeom>
-        </p:spPr>
-      </p:pic>
-      <p:sp>
-        <p:nvSpPr>
-          <p:cNvPr id="12" name="TextBox 11">
-            <a:extLst>
-              <a:ext uri="{FF2B5EF4-FFF2-40B4-BE49-F238E27FC236}">
-                <a16:creationId xmlns:a16="http://schemas.microsoft.com/office/drawing/2014/main" id="{95EB8E7C-A52A-4799-94A5-CB7892FBD08D}"/>
-              </a:ext>
-            </a:extLst>
-          </p:cNvPr>
-          <p:cNvSpPr txBox="1"/>
-          <p:nvPr/>
-        </p:nvSpPr>
-        <p:spPr>
-          <a:xfrm>
-            <a:off x="1171574" y="1200150"/>
-            <a:ext cx="3090601" cy="369332"/>
-          </a:xfrm>
-          <a:prstGeom prst="rect">
-            <a:avLst/>
-          </a:prstGeom>
-          <a:noFill/>
-        </p:spPr>
-        <p:txBody>
-          <a:bodyPr wrap="square" rtlCol="0">
-            <a:spAutoFit/>
-          </a:bodyPr>
-          <a:lstStyle/>
-          <a:p>
-            <a:r>
-              <a:rPr lang="en-US" dirty="0" err="1"/>
-              <a:t>Konfiguracja</a:t>
-            </a:r>
-            <a:r>
-              <a:rPr lang="en-US" dirty="0"/>
-              <a:t> </a:t>
-            </a:r>
-            <a:r>
-              <a:rPr lang="en-US" dirty="0" err="1"/>
-              <a:t>dockera</a:t>
-            </a:r>
-            <a:r>
-              <a:rPr lang="en-US" dirty="0"/>
-              <a:t> </a:t>
-            </a:r>
-            <a:r>
-              <a:rPr lang="en-US" dirty="0" err="1"/>
-              <a:t>i</a:t>
-            </a:r>
-            <a:r>
-              <a:rPr lang="en-US" dirty="0"/>
-              <a:t> </a:t>
-            </a:r>
-            <a:r>
-              <a:rPr lang="en-US" dirty="0" err="1"/>
-              <a:t>ssl</a:t>
-            </a:r>
-            <a:endParaRPr lang="pl-PL" dirty="0"/>
-          </a:p>
-        </p:txBody>
-      </p:sp>
-    </p:spTree>
-    <p:extLst>
-      <p:ext uri="{BB962C8B-B14F-4D97-AF65-F5344CB8AC3E}">
-        <p14:creationId xmlns:p14="http://schemas.microsoft.com/office/powerpoint/2010/main" val="2968921025"/>
       </p:ext>
     </p:extLst>
   </p:cSld>

</xml_diff>